<commit_message>
Transformer ppt title changed
</commit_message>
<xml_diff>
--- a/4. Transformer with Multi-Head Self Attention.pptx
+++ b/4. Transformer with Multi-Head Self Attention.pptx
@@ -221,7 +221,7 @@
           <a:p>
             <a:fld id="{951AC834-92E7-4D32-8823-7B415B6338AF}" type="datetimeFigureOut">
               <a:rPr lang="ko-KR" altLang="en-US" smtClean="0"/>
-              <a:t>2020-09-12</a:t>
+              <a:t>2020-09-13</a:t>
             </a:fld>
             <a:endParaRPr lang="ko-KR" altLang="en-US"/>
           </a:p>
@@ -3300,7 +3300,7 @@
           <a:p>
             <a:fld id="{9E586C3A-20C2-499E-9A98-70C3F2735DDC}" type="datetimeFigureOut">
               <a:rPr lang="ko-KR" altLang="en-US" smtClean="0"/>
-              <a:t>2020-09-12</a:t>
+              <a:t>2020-09-13</a:t>
             </a:fld>
             <a:endParaRPr lang="ko-KR" altLang="en-US"/>
           </a:p>
@@ -3470,7 +3470,7 @@
           <a:p>
             <a:fld id="{9E586C3A-20C2-499E-9A98-70C3F2735DDC}" type="datetimeFigureOut">
               <a:rPr lang="ko-KR" altLang="en-US" smtClean="0"/>
-              <a:t>2020-09-12</a:t>
+              <a:t>2020-09-13</a:t>
             </a:fld>
             <a:endParaRPr lang="ko-KR" altLang="en-US"/>
           </a:p>
@@ -3650,7 +3650,7 @@
           <a:p>
             <a:fld id="{9E586C3A-20C2-499E-9A98-70C3F2735DDC}" type="datetimeFigureOut">
               <a:rPr lang="ko-KR" altLang="en-US" smtClean="0"/>
-              <a:t>2020-09-12</a:t>
+              <a:t>2020-09-13</a:t>
             </a:fld>
             <a:endParaRPr lang="ko-KR" altLang="en-US"/>
           </a:p>
@@ -4217,7 +4217,7 @@
           <a:p>
             <a:fld id="{9E586C3A-20C2-499E-9A98-70C3F2735DDC}" type="datetimeFigureOut">
               <a:rPr lang="ko-KR" altLang="en-US" smtClean="0"/>
-              <a:t>2020-09-12</a:t>
+              <a:t>2020-09-13</a:t>
             </a:fld>
             <a:endParaRPr lang="ko-KR" altLang="en-US"/>
           </a:p>
@@ -4461,7 +4461,7 @@
           <a:p>
             <a:fld id="{9E586C3A-20C2-499E-9A98-70C3F2735DDC}" type="datetimeFigureOut">
               <a:rPr lang="ko-KR" altLang="en-US" smtClean="0"/>
-              <a:t>2020-09-12</a:t>
+              <a:t>2020-09-13</a:t>
             </a:fld>
             <a:endParaRPr lang="ko-KR" altLang="en-US"/>
           </a:p>
@@ -4693,7 +4693,7 @@
           <a:p>
             <a:fld id="{9E586C3A-20C2-499E-9A98-70C3F2735DDC}" type="datetimeFigureOut">
               <a:rPr lang="ko-KR" altLang="en-US" smtClean="0"/>
-              <a:t>2020-09-12</a:t>
+              <a:t>2020-09-13</a:t>
             </a:fld>
             <a:endParaRPr lang="ko-KR" altLang="en-US"/>
           </a:p>
@@ -5060,7 +5060,7 @@
           <a:p>
             <a:fld id="{9E586C3A-20C2-499E-9A98-70C3F2735DDC}" type="datetimeFigureOut">
               <a:rPr lang="ko-KR" altLang="en-US" smtClean="0"/>
-              <a:t>2020-09-12</a:t>
+              <a:t>2020-09-13</a:t>
             </a:fld>
             <a:endParaRPr lang="ko-KR" altLang="en-US"/>
           </a:p>
@@ -5178,7 +5178,7 @@
           <a:p>
             <a:fld id="{9E586C3A-20C2-499E-9A98-70C3F2735DDC}" type="datetimeFigureOut">
               <a:rPr lang="ko-KR" altLang="en-US" smtClean="0"/>
-              <a:t>2020-09-12</a:t>
+              <a:t>2020-09-13</a:t>
             </a:fld>
             <a:endParaRPr lang="ko-KR" altLang="en-US"/>
           </a:p>
@@ -5273,7 +5273,7 @@
           <a:p>
             <a:fld id="{9E586C3A-20C2-499E-9A98-70C3F2735DDC}" type="datetimeFigureOut">
               <a:rPr lang="ko-KR" altLang="en-US" smtClean="0"/>
-              <a:t>2020-09-12</a:t>
+              <a:t>2020-09-13</a:t>
             </a:fld>
             <a:endParaRPr lang="ko-KR" altLang="en-US"/>
           </a:p>
@@ -5550,7 +5550,7 @@
           <a:p>
             <a:fld id="{9E586C3A-20C2-499E-9A98-70C3F2735DDC}" type="datetimeFigureOut">
               <a:rPr lang="ko-KR" altLang="en-US" smtClean="0"/>
-              <a:t>2020-09-12</a:t>
+              <a:t>2020-09-13</a:t>
             </a:fld>
             <a:endParaRPr lang="ko-KR" altLang="en-US"/>
           </a:p>
@@ -5807,7 +5807,7 @@
           <a:p>
             <a:fld id="{9E586C3A-20C2-499E-9A98-70C3F2735DDC}" type="datetimeFigureOut">
               <a:rPr lang="ko-KR" altLang="en-US" smtClean="0"/>
-              <a:t>2020-09-12</a:t>
+              <a:t>2020-09-13</a:t>
             </a:fld>
             <a:endParaRPr lang="ko-KR" altLang="en-US"/>
           </a:p>
@@ -6020,7 +6020,7 @@
           <a:p>
             <a:fld id="{9E586C3A-20C2-499E-9A98-70C3F2735DDC}" type="datetimeFigureOut">
               <a:rPr lang="ko-KR" altLang="en-US" smtClean="0"/>
-              <a:t>2020-09-12</a:t>
+              <a:t>2020-09-13</a:t>
             </a:fld>
             <a:endParaRPr lang="ko-KR" altLang="en-US"/>
           </a:p>
@@ -6435,7 +6435,7 @@
         <p:spPr>
           <a:xfrm>
             <a:off x="558037" y="2137322"/>
-            <a:ext cx="8109208" cy="1238801"/>
+            <a:ext cx="8109208" cy="1200329"/>
           </a:xfrm>
           <a:prstGeom prst="rect">
             <a:avLst/>
@@ -6466,30 +6466,7 @@
                 </a:solidFill>
                 <a:latin typeface="맑은 고딕" panose="020B0503020000020004" pitchFamily="50" charset="-127"/>
               </a:rPr>
-              <a:t>Machine Translation with</a:t>
-            </a:r>
-          </a:p>
-          <a:p>
-            <a:pPr algn="ctr">
-              <a:spcAft>
-                <a:spcPts val="277"/>
-              </a:spcAft>
-            </a:pPr>
-            <a:r>
-              <a:rPr lang="en-US" altLang="ko-KR" sz="3600" spc="-138" dirty="0">
-                <a:ln>
-                  <a:solidFill>
-                    <a:prstClr val="white">
-                      <a:alpha val="0"/>
-                    </a:prstClr>
-                  </a:solidFill>
-                </a:ln>
-                <a:solidFill>
-                  <a:prstClr val="black"/>
-                </a:solidFill>
-                <a:latin typeface="맑은 고딕" panose="020B0503020000020004" pitchFamily="50" charset="-127"/>
-              </a:rPr>
-              <a:t>Attention Mechanism</a:t>
+              <a:t>Transformer with Multi-Head Self Attention</a:t>
             </a:r>
           </a:p>
         </p:txBody>
@@ -8113,8 +8090,8 @@
           </p:txBody>
         </p:sp>
       </p:grpSp>
-      <mc:AlternateContent xmlns:mc="http://schemas.openxmlformats.org/markup-compatibility/2006">
-        <mc:Choice xmlns:a14="http://schemas.microsoft.com/office/drawing/2010/main" Requires="a14">
+      <mc:AlternateContent xmlns:mc="http://schemas.openxmlformats.org/markup-compatibility/2006" xmlns:a14="http://schemas.microsoft.com/office/drawing/2010/main">
+        <mc:Choice Requires="a14">
           <p:sp>
             <p:nvSpPr>
               <p:cNvPr id="11" name="TextBox 10">
@@ -8176,7 +8153,7 @@
             </p:txBody>
           </p:sp>
         </mc:Choice>
-        <mc:Fallback>
+        <mc:Fallback xmlns="">
           <p:sp>
             <p:nvSpPr>
               <p:cNvPr id="11" name="TextBox 10">
@@ -8221,8 +8198,8 @@
           </p:sp>
         </mc:Fallback>
       </mc:AlternateContent>
-      <mc:AlternateContent xmlns:mc="http://schemas.openxmlformats.org/markup-compatibility/2006">
-        <mc:Choice xmlns:a14="http://schemas.microsoft.com/office/drawing/2010/main" Requires="a14">
+      <mc:AlternateContent xmlns:mc="http://schemas.openxmlformats.org/markup-compatibility/2006" xmlns:a14="http://schemas.microsoft.com/office/drawing/2010/main">
+        <mc:Choice Requires="a14">
           <p:sp>
             <p:nvSpPr>
               <p:cNvPr id="127" name="TextBox 126">
@@ -8296,7 +8273,7 @@
             </p:txBody>
           </p:sp>
         </mc:Choice>
-        <mc:Fallback>
+        <mc:Fallback xmlns="">
           <p:sp>
             <p:nvSpPr>
               <p:cNvPr id="127" name="TextBox 126">
@@ -9712,8 +9689,8 @@
           </p:txBody>
         </p:sp>
       </p:grpSp>
-      <mc:AlternateContent xmlns:mc="http://schemas.openxmlformats.org/markup-compatibility/2006">
-        <mc:Choice xmlns:a14="http://schemas.microsoft.com/office/drawing/2010/main" Requires="a14">
+      <mc:AlternateContent xmlns:mc="http://schemas.openxmlformats.org/markup-compatibility/2006" xmlns:a14="http://schemas.microsoft.com/office/drawing/2010/main">
+        <mc:Choice Requires="a14">
           <p:sp>
             <p:nvSpPr>
               <p:cNvPr id="133" name="TextBox 132">
@@ -9775,7 +9752,7 @@
             </p:txBody>
           </p:sp>
         </mc:Choice>
-        <mc:Fallback>
+        <mc:Fallback xmlns="">
           <p:sp>
             <p:nvSpPr>
               <p:cNvPr id="133" name="TextBox 132">
@@ -9820,8 +9797,8 @@
           </p:sp>
         </mc:Fallback>
       </mc:AlternateContent>
-      <mc:AlternateContent xmlns:mc="http://schemas.openxmlformats.org/markup-compatibility/2006">
-        <mc:Choice xmlns:a14="http://schemas.microsoft.com/office/drawing/2010/main" Requires="a14">
+      <mc:AlternateContent xmlns:mc="http://schemas.openxmlformats.org/markup-compatibility/2006" xmlns:a14="http://schemas.microsoft.com/office/drawing/2010/main">
+        <mc:Choice Requires="a14">
           <p:sp>
             <p:nvSpPr>
               <p:cNvPr id="134" name="TextBox 133">
@@ -9883,7 +9860,7 @@
             </p:txBody>
           </p:sp>
         </mc:Choice>
-        <mc:Fallback>
+        <mc:Fallback xmlns="">
           <p:sp>
             <p:nvSpPr>
               <p:cNvPr id="134" name="TextBox 133">
@@ -15422,13 +15399,13 @@
   <p:clrMapOvr>
     <a:masterClrMapping/>
   </p:clrMapOvr>
-  <mc:AlternateContent xmlns:mc="http://schemas.openxmlformats.org/markup-compatibility/2006">
-    <mc:Choice xmlns:p14="http://schemas.microsoft.com/office/powerpoint/2010/main" Requires="p14">
+  <mc:AlternateContent xmlns:mc="http://schemas.openxmlformats.org/markup-compatibility/2006" xmlns:p14="http://schemas.microsoft.com/office/powerpoint/2010/main">
+    <mc:Choice Requires="p14">
       <p:transition spd="med" p14:dur="700">
         <p:fade/>
       </p:transition>
     </mc:Choice>
-    <mc:Fallback>
+    <mc:Fallback xmlns="">
       <p:transition spd="med">
         <p:fade/>
       </p:transition>
@@ -17441,13 +17418,13 @@
   <p:clrMapOvr>
     <a:masterClrMapping/>
   </p:clrMapOvr>
-  <mc:AlternateContent xmlns:mc="http://schemas.openxmlformats.org/markup-compatibility/2006">
-    <mc:Choice xmlns:p14="http://schemas.microsoft.com/office/powerpoint/2010/main" Requires="p14">
+  <mc:AlternateContent xmlns:mc="http://schemas.openxmlformats.org/markup-compatibility/2006" xmlns:p14="http://schemas.microsoft.com/office/powerpoint/2010/main">
+    <mc:Choice Requires="p14">
       <p:transition spd="med" p14:dur="700">
         <p:fade/>
       </p:transition>
     </mc:Choice>
-    <mc:Fallback>
+    <mc:Fallback xmlns="">
       <p:transition spd="med">
         <p:fade/>
       </p:transition>
@@ -17572,8 +17549,8 @@
           </a:p>
         </p:txBody>
       </p:sp>
-      <mc:AlternateContent xmlns:mc="http://schemas.openxmlformats.org/markup-compatibility/2006">
-        <mc:Choice xmlns:a14="http://schemas.microsoft.com/office/drawing/2010/main" Requires="a14">
+      <mc:AlternateContent xmlns:mc="http://schemas.openxmlformats.org/markup-compatibility/2006" xmlns:a14="http://schemas.microsoft.com/office/drawing/2010/main">
+        <mc:Choice Requires="a14">
           <p:sp>
             <p:nvSpPr>
               <p:cNvPr id="4" name="TextBox 3">
@@ -18266,7 +18243,7 @@
             </p:txBody>
           </p:sp>
         </mc:Choice>
-        <mc:Fallback>
+        <mc:Fallback xmlns="">
           <p:sp>
             <p:nvSpPr>
               <p:cNvPr id="4" name="TextBox 3">
@@ -18381,13 +18358,13 @@
   <p:clrMapOvr>
     <a:masterClrMapping/>
   </p:clrMapOvr>
-  <mc:AlternateContent xmlns:mc="http://schemas.openxmlformats.org/markup-compatibility/2006">
-    <mc:Choice xmlns:p14="http://schemas.microsoft.com/office/powerpoint/2010/main" Requires="p14">
+  <mc:AlternateContent xmlns:mc="http://schemas.openxmlformats.org/markup-compatibility/2006" xmlns:p14="http://schemas.microsoft.com/office/powerpoint/2010/main">
+    <mc:Choice Requires="p14">
       <p:transition spd="med" p14:dur="700">
         <p:fade/>
       </p:transition>
     </mc:Choice>
-    <mc:Fallback>
+    <mc:Fallback xmlns="">
       <p:transition spd="med">
         <p:fade/>
       </p:transition>
@@ -21533,8 +21510,8 @@
             </a:fontRef>
           </p:style>
         </p:cxnSp>
-        <mc:AlternateContent xmlns:mc="http://schemas.openxmlformats.org/markup-compatibility/2006">
-          <mc:Choice xmlns:a14="http://schemas.microsoft.com/office/drawing/2010/main" Requires="a14">
+        <mc:AlternateContent xmlns:mc="http://schemas.openxmlformats.org/markup-compatibility/2006" xmlns:a14="http://schemas.microsoft.com/office/drawing/2010/main">
+          <mc:Choice Requires="a14">
             <p:sp>
               <p:nvSpPr>
                 <p:cNvPr id="101" name="TextBox 100">
@@ -21563,6 +21540,7 @@
                 </a:bodyPr>
                 <a:lstStyle/>
                 <a:p>
+                  <a:pPr/>
                   <a14:m>
                     <m:oMathPara xmlns:m="http://schemas.openxmlformats.org/officeDocument/2006/math">
                       <m:oMathParaPr>
@@ -21602,7 +21580,7 @@
               </p:txBody>
             </p:sp>
           </mc:Choice>
-          <mc:Fallback>
+          <mc:Fallback xmlns="">
             <p:sp>
               <p:nvSpPr>
                 <p:cNvPr id="101" name="TextBox 100">
@@ -21647,8 +21625,8 @@
             </p:sp>
           </mc:Fallback>
         </mc:AlternateContent>
-        <mc:AlternateContent xmlns:mc="http://schemas.openxmlformats.org/markup-compatibility/2006">
-          <mc:Choice xmlns:a14="http://schemas.microsoft.com/office/drawing/2010/main" Requires="a14">
+        <mc:AlternateContent xmlns:mc="http://schemas.openxmlformats.org/markup-compatibility/2006" xmlns:a14="http://schemas.microsoft.com/office/drawing/2010/main">
+          <mc:Choice Requires="a14">
             <p:sp>
               <p:nvSpPr>
                 <p:cNvPr id="102" name="TextBox 101">
@@ -21677,6 +21655,7 @@
                 </a:bodyPr>
                 <a:lstStyle/>
                 <a:p>
+                  <a:pPr/>
                   <a14:m>
                     <m:oMathPara xmlns:m="http://schemas.openxmlformats.org/officeDocument/2006/math">
                       <m:oMathParaPr>
@@ -21716,7 +21695,7 @@
               </p:txBody>
             </p:sp>
           </mc:Choice>
-          <mc:Fallback>
+          <mc:Fallback xmlns="">
             <p:sp>
               <p:nvSpPr>
                 <p:cNvPr id="102" name="TextBox 101">
@@ -21761,8 +21740,8 @@
             </p:sp>
           </mc:Fallback>
         </mc:AlternateContent>
-        <mc:AlternateContent xmlns:mc="http://schemas.openxmlformats.org/markup-compatibility/2006">
-          <mc:Choice xmlns:a14="http://schemas.microsoft.com/office/drawing/2010/main" Requires="a14">
+        <mc:AlternateContent xmlns:mc="http://schemas.openxmlformats.org/markup-compatibility/2006" xmlns:a14="http://schemas.microsoft.com/office/drawing/2010/main">
+          <mc:Choice Requires="a14">
             <p:sp>
               <p:nvSpPr>
                 <p:cNvPr id="103" name="TextBox 102">
@@ -21791,6 +21770,7 @@
                 </a:bodyPr>
                 <a:lstStyle/>
                 <a:p>
+                  <a:pPr/>
                   <a14:m>
                     <m:oMathPara xmlns:m="http://schemas.openxmlformats.org/officeDocument/2006/math">
                       <m:oMathParaPr>
@@ -21836,7 +21816,7 @@
               </p:txBody>
             </p:sp>
           </mc:Choice>
-          <mc:Fallback>
+          <mc:Fallback xmlns="">
             <p:sp>
               <p:nvSpPr>
                 <p:cNvPr id="103" name="TextBox 102">
@@ -21881,8 +21861,8 @@
             </p:sp>
           </mc:Fallback>
         </mc:AlternateContent>
-        <mc:AlternateContent xmlns:mc="http://schemas.openxmlformats.org/markup-compatibility/2006">
-          <mc:Choice xmlns:a14="http://schemas.microsoft.com/office/drawing/2010/main" Requires="a14">
+        <mc:AlternateContent xmlns:mc="http://schemas.openxmlformats.org/markup-compatibility/2006" xmlns:a14="http://schemas.microsoft.com/office/drawing/2010/main">
+          <mc:Choice Requires="a14">
             <p:sp>
               <p:nvSpPr>
                 <p:cNvPr id="104" name="TextBox 103">
@@ -21911,6 +21891,7 @@
                 </a:bodyPr>
                 <a:lstStyle/>
                 <a:p>
+                  <a:pPr/>
                   <a14:m>
                     <m:oMathPara xmlns:m="http://schemas.openxmlformats.org/officeDocument/2006/math">
                       <m:oMathParaPr>
@@ -21950,7 +21931,7 @@
               </p:txBody>
             </p:sp>
           </mc:Choice>
-          <mc:Fallback>
+          <mc:Fallback xmlns="">
             <p:sp>
               <p:nvSpPr>
                 <p:cNvPr id="104" name="TextBox 103">
@@ -26146,8 +26127,8 @@
           </a:p>
         </p:txBody>
       </p:sp>
-      <mc:AlternateContent xmlns:mc="http://schemas.openxmlformats.org/markup-compatibility/2006">
-        <mc:Choice xmlns:a14="http://schemas.microsoft.com/office/drawing/2010/main" Requires="a14">
+      <mc:AlternateContent xmlns:mc="http://schemas.openxmlformats.org/markup-compatibility/2006" xmlns:a14="http://schemas.microsoft.com/office/drawing/2010/main">
+        <mc:Choice Requires="a14">
           <p:sp>
             <p:nvSpPr>
               <p:cNvPr id="8" name="TextBox 7">
@@ -26368,7 +26349,7 @@
             </p:txBody>
           </p:sp>
         </mc:Choice>
-        <mc:Fallback>
+        <mc:Fallback xmlns="">
           <p:sp>
             <p:nvSpPr>
               <p:cNvPr id="8" name="TextBox 7">
@@ -27849,8 +27830,8 @@
           </a:p>
         </p:txBody>
       </p:sp>
-      <mc:AlternateContent xmlns:mc="http://schemas.openxmlformats.org/markup-compatibility/2006">
-        <mc:Choice xmlns:a14="http://schemas.microsoft.com/office/drawing/2010/main" Requires="a14">
+      <mc:AlternateContent xmlns:mc="http://schemas.openxmlformats.org/markup-compatibility/2006" xmlns:a14="http://schemas.microsoft.com/office/drawing/2010/main">
+        <mc:Choice Requires="a14">
           <p:sp>
             <p:nvSpPr>
               <p:cNvPr id="37" name="타원 36">
@@ -27944,7 +27925,7 @@
             </p:txBody>
           </p:sp>
         </mc:Choice>
-        <mc:Fallback>
+        <mc:Fallback xmlns="">
           <p:sp>
             <p:nvSpPr>
               <p:cNvPr id="37" name="타원 36">
@@ -28285,8 +28266,8 @@
           </a:fontRef>
         </p:style>
       </p:cxnSp>
-      <mc:AlternateContent xmlns:mc="http://schemas.openxmlformats.org/markup-compatibility/2006">
-        <mc:Choice xmlns:a14="http://schemas.microsoft.com/office/drawing/2010/main" Requires="a14">
+      <mc:AlternateContent xmlns:mc="http://schemas.openxmlformats.org/markup-compatibility/2006" xmlns:a14="http://schemas.microsoft.com/office/drawing/2010/main">
+        <mc:Choice Requires="a14">
           <p:sp>
             <p:nvSpPr>
               <p:cNvPr id="119" name="TextBox 118">
@@ -28367,7 +28348,7 @@
             </p:txBody>
           </p:sp>
         </mc:Choice>
-        <mc:Fallback>
+        <mc:Fallback xmlns="">
           <p:sp>
             <p:nvSpPr>
               <p:cNvPr id="119" name="TextBox 118">
@@ -34124,13 +34105,13 @@
   <p:clrMapOvr>
     <a:masterClrMapping/>
   </p:clrMapOvr>
-  <mc:AlternateContent xmlns:mc="http://schemas.openxmlformats.org/markup-compatibility/2006">
-    <mc:Choice xmlns:p14="http://schemas.microsoft.com/office/powerpoint/2010/main" Requires="p14">
+  <mc:AlternateContent xmlns:mc="http://schemas.openxmlformats.org/markup-compatibility/2006" xmlns:p14="http://schemas.microsoft.com/office/powerpoint/2010/main">
+    <mc:Choice Requires="p14">
       <p:transition spd="med" p14:dur="700">
         <p:fade/>
       </p:transition>
     </mc:Choice>
-    <mc:Fallback>
+    <mc:Fallback xmlns="">
       <p:transition spd="med">
         <p:fade/>
       </p:transition>
@@ -35452,8 +35433,8 @@
           </a:prstGeom>
         </p:spPr>
       </p:pic>
-      <mc:AlternateContent xmlns:mc="http://schemas.openxmlformats.org/markup-compatibility/2006">
-        <mc:Choice xmlns:a14="http://schemas.microsoft.com/office/drawing/2010/main" Requires="a14">
+      <mc:AlternateContent xmlns:mc="http://schemas.openxmlformats.org/markup-compatibility/2006" xmlns:a14="http://schemas.microsoft.com/office/drawing/2010/main">
+        <mc:Choice Requires="a14">
           <p:sp>
             <p:nvSpPr>
               <p:cNvPr id="12" name="TextBox 11">
@@ -35622,7 +35603,7 @@
             </p:txBody>
           </p:sp>
         </mc:Choice>
-        <mc:Fallback>
+        <mc:Fallback xmlns="">
           <p:sp>
             <p:nvSpPr>
               <p:cNvPr id="12" name="TextBox 11">
@@ -35667,8 +35648,8 @@
           </p:sp>
         </mc:Fallback>
       </mc:AlternateContent>
-      <mc:AlternateContent xmlns:mc="http://schemas.openxmlformats.org/markup-compatibility/2006">
-        <mc:Choice xmlns:a14="http://schemas.microsoft.com/office/drawing/2010/main" Requires="a14">
+      <mc:AlternateContent xmlns:mc="http://schemas.openxmlformats.org/markup-compatibility/2006" xmlns:a14="http://schemas.microsoft.com/office/drawing/2010/main">
+        <mc:Choice Requires="a14">
           <p:sp>
             <p:nvSpPr>
               <p:cNvPr id="13" name="TextBox 12">
@@ -35882,7 +35863,7 @@
             </p:txBody>
           </p:sp>
         </mc:Choice>
-        <mc:Fallback>
+        <mc:Fallback xmlns="">
           <p:sp>
             <p:nvSpPr>
               <p:cNvPr id="13" name="TextBox 12">
@@ -36028,13 +36009,13 @@
   <p:clrMapOvr>
     <a:masterClrMapping/>
   </p:clrMapOvr>
-  <mc:AlternateContent xmlns:mc="http://schemas.openxmlformats.org/markup-compatibility/2006">
-    <mc:Choice xmlns:p14="http://schemas.microsoft.com/office/powerpoint/2010/main" Requires="p14">
+  <mc:AlternateContent xmlns:mc="http://schemas.openxmlformats.org/markup-compatibility/2006" xmlns:p14="http://schemas.microsoft.com/office/powerpoint/2010/main">
+    <mc:Choice Requires="p14">
       <p:transition spd="med" p14:dur="700">
         <p:fade/>
       </p:transition>
     </mc:Choice>
-    <mc:Fallback>
+    <mc:Fallback xmlns="">
       <p:transition spd="med">
         <p:fade/>
       </p:transition>
@@ -36818,8 +36799,8 @@
           </a:p>
         </p:txBody>
       </p:sp>
-      <mc:AlternateContent xmlns:mc="http://schemas.openxmlformats.org/markup-compatibility/2006">
-        <mc:Choice xmlns:a14="http://schemas.microsoft.com/office/drawing/2010/main" Requires="a14">
+      <mc:AlternateContent xmlns:mc="http://schemas.openxmlformats.org/markup-compatibility/2006" xmlns:a14="http://schemas.microsoft.com/office/drawing/2010/main">
+        <mc:Choice Requires="a14">
           <p:sp>
             <p:nvSpPr>
               <p:cNvPr id="7" name="TextBox 6">
@@ -36848,6 +36829,7 @@
               </a:bodyPr>
               <a:lstStyle/>
               <a:p>
+                <a:pPr/>
                 <a14:m>
                   <m:oMathPara xmlns:m="http://schemas.openxmlformats.org/officeDocument/2006/math">
                     <m:oMathParaPr>
@@ -36916,7 +36898,7 @@
             </p:txBody>
           </p:sp>
         </mc:Choice>
-        <mc:Fallback>
+        <mc:Fallback xmlns="">
           <p:sp>
             <p:nvSpPr>
               <p:cNvPr id="7" name="TextBox 6">
@@ -36961,8 +36943,8 @@
           </p:sp>
         </mc:Fallback>
       </mc:AlternateContent>
-      <mc:AlternateContent xmlns:mc="http://schemas.openxmlformats.org/markup-compatibility/2006">
-        <mc:Choice xmlns:a14="http://schemas.microsoft.com/office/drawing/2010/main" Requires="a14">
+      <mc:AlternateContent xmlns:mc="http://schemas.openxmlformats.org/markup-compatibility/2006" xmlns:a14="http://schemas.microsoft.com/office/drawing/2010/main">
+        <mc:Choice Requires="a14">
           <p:sp>
             <p:nvSpPr>
               <p:cNvPr id="18" name="TextBox 17">
@@ -36991,6 +36973,7 @@
               </a:bodyPr>
               <a:lstStyle/>
               <a:p>
+                <a:pPr/>
                 <a14:m>
                   <m:oMathPara xmlns:m="http://schemas.openxmlformats.org/officeDocument/2006/math">
                     <m:oMathParaPr>
@@ -37059,7 +37042,7 @@
             </p:txBody>
           </p:sp>
         </mc:Choice>
-        <mc:Fallback>
+        <mc:Fallback xmlns="">
           <p:sp>
             <p:nvSpPr>
               <p:cNvPr id="18" name="TextBox 17">
@@ -37104,8 +37087,8 @@
           </p:sp>
         </mc:Fallback>
       </mc:AlternateContent>
-      <mc:AlternateContent xmlns:mc="http://schemas.openxmlformats.org/markup-compatibility/2006">
-        <mc:Choice xmlns:a14="http://schemas.microsoft.com/office/drawing/2010/main" Requires="a14">
+      <mc:AlternateContent xmlns:mc="http://schemas.openxmlformats.org/markup-compatibility/2006" xmlns:a14="http://schemas.microsoft.com/office/drawing/2010/main">
+        <mc:Choice Requires="a14">
           <p:sp>
             <p:nvSpPr>
               <p:cNvPr id="19" name="TextBox 18">
@@ -37134,6 +37117,7 @@
               </a:bodyPr>
               <a:lstStyle/>
               <a:p>
+                <a:pPr/>
                 <a14:m>
                   <m:oMathPara xmlns:m="http://schemas.openxmlformats.org/officeDocument/2006/math">
                     <m:oMathParaPr>
@@ -37196,6 +37180,7 @@
                 </a:endParaRPr>
               </a:p>
               <a:p>
+                <a:pPr/>
                 <a14:m>
                   <m:oMathPara xmlns:m="http://schemas.openxmlformats.org/officeDocument/2006/math">
                     <m:oMathParaPr>
@@ -37240,7 +37225,7 @@
             </p:txBody>
           </p:sp>
         </mc:Choice>
-        <mc:Fallback>
+        <mc:Fallback xmlns="">
           <p:sp>
             <p:nvSpPr>
               <p:cNvPr id="19" name="TextBox 18">
@@ -37295,13 +37280,13 @@
   <p:clrMapOvr>
     <a:masterClrMapping/>
   </p:clrMapOvr>
-  <mc:AlternateContent xmlns:mc="http://schemas.openxmlformats.org/markup-compatibility/2006">
-    <mc:Choice xmlns:p14="http://schemas.microsoft.com/office/powerpoint/2010/main" Requires="p14">
+  <mc:AlternateContent xmlns:mc="http://schemas.openxmlformats.org/markup-compatibility/2006" xmlns:p14="http://schemas.microsoft.com/office/powerpoint/2010/main">
+    <mc:Choice Requires="p14">
       <p:transition spd="med" p14:dur="700">
         <p:fade/>
       </p:transition>
     </mc:Choice>
-    <mc:Fallback>
+    <mc:Fallback xmlns="">
       <p:transition spd="med">
         <p:fade/>
       </p:transition>
@@ -39513,8 +39498,8 @@
           </p:txBody>
         </p:sp>
       </p:grpSp>
-      <mc:AlternateContent xmlns:mc="http://schemas.openxmlformats.org/markup-compatibility/2006">
-        <mc:Choice xmlns:a14="http://schemas.microsoft.com/office/drawing/2010/main" Requires="a14">
+      <mc:AlternateContent xmlns:mc="http://schemas.openxmlformats.org/markup-compatibility/2006" xmlns:a14="http://schemas.microsoft.com/office/drawing/2010/main">
+        <mc:Choice Requires="a14">
           <p:sp>
             <p:nvSpPr>
               <p:cNvPr id="82" name="TextBox 81">
@@ -39543,6 +39528,7 @@
               </a:bodyPr>
               <a:lstStyle/>
               <a:p>
+                <a:pPr/>
                 <a14:m>
                   <m:oMathPara xmlns:m="http://schemas.openxmlformats.org/officeDocument/2006/math">
                     <m:oMathParaPr>
@@ -39575,7 +39561,7 @@
             </p:txBody>
           </p:sp>
         </mc:Choice>
-        <mc:Fallback>
+        <mc:Fallback xmlns="">
           <p:sp>
             <p:nvSpPr>
               <p:cNvPr id="82" name="TextBox 81">
@@ -40605,8 +40591,8 @@
           </a:fontRef>
         </p:style>
       </p:cxnSp>
-      <mc:AlternateContent xmlns:mc="http://schemas.openxmlformats.org/markup-compatibility/2006">
-        <mc:Choice xmlns:a14="http://schemas.microsoft.com/office/drawing/2010/main" Requires="a14">
+      <mc:AlternateContent xmlns:mc="http://schemas.openxmlformats.org/markup-compatibility/2006" xmlns:a14="http://schemas.microsoft.com/office/drawing/2010/main">
+        <mc:Choice Requires="a14">
           <p:sp>
             <p:nvSpPr>
               <p:cNvPr id="96" name="TextBox 95">
@@ -40635,6 +40621,7 @@
               </a:bodyPr>
               <a:lstStyle/>
               <a:p>
+                <a:pPr/>
                 <a14:m>
                   <m:oMathPara xmlns:m="http://schemas.openxmlformats.org/officeDocument/2006/math">
                     <m:oMathParaPr>
@@ -40667,7 +40654,7 @@
             </p:txBody>
           </p:sp>
         </mc:Choice>
-        <mc:Fallback>
+        <mc:Fallback xmlns="">
           <p:sp>
             <p:nvSpPr>
               <p:cNvPr id="96" name="TextBox 95">
@@ -40861,8 +40848,8 @@
           </a:fontRef>
         </p:style>
       </p:cxnSp>
-      <mc:AlternateContent xmlns:mc="http://schemas.openxmlformats.org/markup-compatibility/2006">
-        <mc:Choice xmlns:a14="http://schemas.microsoft.com/office/drawing/2010/main" Requires="a14">
+      <mc:AlternateContent xmlns:mc="http://schemas.openxmlformats.org/markup-compatibility/2006" xmlns:a14="http://schemas.microsoft.com/office/drawing/2010/main">
+        <mc:Choice Requires="a14">
           <p:sp>
             <p:nvSpPr>
               <p:cNvPr id="124" name="TextBox 123">
@@ -40891,6 +40878,7 @@
               </a:bodyPr>
               <a:lstStyle/>
               <a:p>
+                <a:pPr/>
                 <a14:m>
                   <m:oMathPara xmlns:m="http://schemas.openxmlformats.org/officeDocument/2006/math">
                     <m:oMathParaPr>
@@ -40939,7 +40927,7 @@
             </p:txBody>
           </p:sp>
         </mc:Choice>
-        <mc:Fallback>
+        <mc:Fallback xmlns="">
           <p:sp>
             <p:nvSpPr>
               <p:cNvPr id="124" name="TextBox 123">
@@ -40984,8 +40972,8 @@
           </p:sp>
         </mc:Fallback>
       </mc:AlternateContent>
-      <mc:AlternateContent xmlns:mc="http://schemas.openxmlformats.org/markup-compatibility/2006">
-        <mc:Choice xmlns:a14="http://schemas.microsoft.com/office/drawing/2010/main" Requires="a14">
+      <mc:AlternateContent xmlns:mc="http://schemas.openxmlformats.org/markup-compatibility/2006" xmlns:a14="http://schemas.microsoft.com/office/drawing/2010/main">
+        <mc:Choice Requires="a14">
           <p:sp>
             <p:nvSpPr>
               <p:cNvPr id="135" name="TextBox 134">
@@ -41014,6 +41002,7 @@
               </a:bodyPr>
               <a:lstStyle/>
               <a:p>
+                <a:pPr/>
                 <a14:m>
                   <m:oMathPara xmlns:m="http://schemas.openxmlformats.org/officeDocument/2006/math">
                     <m:oMathParaPr>
@@ -41068,7 +41057,7 @@
             </p:txBody>
           </p:sp>
         </mc:Choice>
-        <mc:Fallback>
+        <mc:Fallback xmlns="">
           <p:sp>
             <p:nvSpPr>
               <p:cNvPr id="135" name="TextBox 134">
@@ -41113,8 +41102,8 @@
           </p:sp>
         </mc:Fallback>
       </mc:AlternateContent>
-      <mc:AlternateContent xmlns:mc="http://schemas.openxmlformats.org/markup-compatibility/2006">
-        <mc:Choice xmlns:a14="http://schemas.microsoft.com/office/drawing/2010/main" Requires="a14">
+      <mc:AlternateContent xmlns:mc="http://schemas.openxmlformats.org/markup-compatibility/2006" xmlns:a14="http://schemas.microsoft.com/office/drawing/2010/main">
+        <mc:Choice Requires="a14">
           <p:sp>
             <p:nvSpPr>
               <p:cNvPr id="136" name="TextBox 135">
@@ -41143,6 +41132,7 @@
               </a:bodyPr>
               <a:lstStyle/>
               <a:p>
+                <a:pPr/>
                 <a14:m>
                   <m:oMathPara xmlns:m="http://schemas.openxmlformats.org/officeDocument/2006/math">
                     <m:oMathParaPr>
@@ -41191,7 +41181,7 @@
             </p:txBody>
           </p:sp>
         </mc:Choice>
-        <mc:Fallback>
+        <mc:Fallback xmlns="">
           <p:sp>
             <p:nvSpPr>
               <p:cNvPr id="136" name="TextBox 135">
@@ -41276,13 +41266,13 @@
   <p:clrMapOvr>
     <a:masterClrMapping/>
   </p:clrMapOvr>
-  <mc:AlternateContent xmlns:mc="http://schemas.openxmlformats.org/markup-compatibility/2006">
-    <mc:Choice xmlns:p14="http://schemas.microsoft.com/office/powerpoint/2010/main" Requires="p14">
+  <mc:AlternateContent xmlns:mc="http://schemas.openxmlformats.org/markup-compatibility/2006" xmlns:p14="http://schemas.microsoft.com/office/powerpoint/2010/main">
+    <mc:Choice Requires="p14">
       <p:transition spd="med" p14:dur="700">
         <p:fade/>
       </p:transition>
     </mc:Choice>
-    <mc:Fallback>
+    <mc:Fallback xmlns="">
       <p:transition spd="med">
         <p:fade/>
       </p:transition>
@@ -41814,12 +41804,6 @@
 </file>
 
 <file path=customXml/item1.xml><?xml version="1.0" encoding="utf-8"?>
-<p:properties xmlns:p="http://schemas.microsoft.com/office/2006/metadata/properties" xmlns:xsi="http://www.w3.org/2001/XMLSchema-instance" xmlns:pc="http://schemas.microsoft.com/office/infopath/2007/PartnerControls">
-  <documentManagement/>
-</p:properties>
-</file>
-
-<file path=customXml/item2.xml><?xml version="1.0" encoding="utf-8"?>
 <ct:contentTypeSchema xmlns:ct="http://schemas.microsoft.com/office/2006/metadata/contentType" xmlns:ma="http://schemas.microsoft.com/office/2006/metadata/properties/metaAttributes" ct:_="" ma:_="" ma:contentTypeName="문서" ma:contentTypeID="0x01010053C7363D32AED841922872DC7B14D6B5" ma:contentTypeVersion="2" ma:contentTypeDescription="새 문서를 만듭니다." ma:contentTypeScope="" ma:versionID="1fb2c014f52f953255d37e125c7d80de">
   <xsd:schema xmlns:xsd="http://www.w3.org/2001/XMLSchema" xmlns:xs="http://www.w3.org/2001/XMLSchema" xmlns:p="http://schemas.microsoft.com/office/2006/metadata/properties" xmlns:ns3="7e911382-0fe7-4b42-b60f-8f62ce1e92bb" targetNamespace="http://schemas.microsoft.com/office/2006/metadata/properties" ma:root="true" ma:fieldsID="c11ed5114e86517bcc3794aa7dd35b60" ns3:_="">
     <xsd:import namespace="7e911382-0fe7-4b42-b60f-8f62ce1e92bb"/>
@@ -41951,6 +41935,12 @@
 </ct:contentTypeSchema>
 </file>
 
+<file path=customXml/item2.xml><?xml version="1.0" encoding="utf-8"?>
+<p:properties xmlns:p="http://schemas.microsoft.com/office/2006/metadata/properties" xmlns:xsi="http://www.w3.org/2001/XMLSchema-instance" xmlns:pc="http://schemas.microsoft.com/office/infopath/2007/PartnerControls">
+  <documentManagement/>
+</p:properties>
+</file>
+
 <file path=customXml/item3.xml><?xml version="1.0" encoding="utf-8"?>
 <?mso-contentType ?>
 <FormTemplates xmlns="http://schemas.microsoft.com/sharepoint/v3/contenttype/forms">
@@ -41961,22 +41951,6 @@
 </file>
 
 <file path=customXml/itemProps1.xml><?xml version="1.0" encoding="utf-8"?>
-<ds:datastoreItem xmlns:ds="http://schemas.openxmlformats.org/officeDocument/2006/customXml" ds:itemID="{7DB703A1-8B74-462A-806E-B4A91990B340}">
-  <ds:schemaRefs>
-    <ds:schemaRef ds:uri="http://purl.org/dc/elements/1.1/"/>
-    <ds:schemaRef ds:uri="http://schemas.microsoft.com/office/infopath/2007/PartnerControls"/>
-    <ds:schemaRef ds:uri="http://www.w3.org/XML/1998/namespace"/>
-    <ds:schemaRef ds:uri="http://purl.org/dc/terms/"/>
-    <ds:schemaRef ds:uri="http://schemas.microsoft.com/office/2006/metadata/properties"/>
-    <ds:schemaRef ds:uri="http://schemas.microsoft.com/office/2006/documentManagement/types"/>
-    <ds:schemaRef ds:uri="http://purl.org/dc/dcmitype/"/>
-    <ds:schemaRef ds:uri="http://schemas.openxmlformats.org/package/2006/metadata/core-properties"/>
-    <ds:schemaRef ds:uri="7e911382-0fe7-4b42-b60f-8f62ce1e92bb"/>
-  </ds:schemaRefs>
-</ds:datastoreItem>
-</file>
-
-<file path=customXml/itemProps2.xml><?xml version="1.0" encoding="utf-8"?>
 <ds:datastoreItem xmlns:ds="http://schemas.openxmlformats.org/officeDocument/2006/customXml" ds:itemID="{C01B4029-B2A9-44F4-83FD-AAC0372222EF}">
   <ds:schemaRefs>
     <ds:schemaRef ds:uri="http://schemas.microsoft.com/office/2006/metadata/contentType"/>
@@ -41994,6 +41968,22 @@
 </ds:datastoreItem>
 </file>
 
+<file path=customXml/itemProps2.xml><?xml version="1.0" encoding="utf-8"?>
+<ds:datastoreItem xmlns:ds="http://schemas.openxmlformats.org/officeDocument/2006/customXml" ds:itemID="{7DB703A1-8B74-462A-806E-B4A91990B340}">
+  <ds:schemaRefs>
+    <ds:schemaRef ds:uri="http://purl.org/dc/elements/1.1/"/>
+    <ds:schemaRef ds:uri="http://schemas.microsoft.com/office/infopath/2007/PartnerControls"/>
+    <ds:schemaRef ds:uri="http://www.w3.org/XML/1998/namespace"/>
+    <ds:schemaRef ds:uri="http://purl.org/dc/terms/"/>
+    <ds:schemaRef ds:uri="http://schemas.microsoft.com/office/2006/metadata/properties"/>
+    <ds:schemaRef ds:uri="http://schemas.microsoft.com/office/2006/documentManagement/types"/>
+    <ds:schemaRef ds:uri="http://purl.org/dc/dcmitype/"/>
+    <ds:schemaRef ds:uri="http://schemas.openxmlformats.org/package/2006/metadata/core-properties"/>
+    <ds:schemaRef ds:uri="7e911382-0fe7-4b42-b60f-8f62ce1e92bb"/>
+  </ds:schemaRefs>
+</ds:datastoreItem>
+</file>
+
 <file path=customXml/itemProps3.xml><?xml version="1.0" encoding="utf-8"?>
 <ds:datastoreItem xmlns:ds="http://schemas.openxmlformats.org/officeDocument/2006/customXml" ds:itemID="{9A07E6BB-35D2-48F0-B5B9-27FAA1AADD7A}">
   <ds:schemaRefs>

</xml_diff>